<commit_message>
Added Canvas and Charts
</commit_message>
<xml_diff>
--- a/Lecture Slides/19 js maps street.pptx
+++ b/Lecture Slides/19 js maps street.pptx
@@ -236,7 +236,7 @@
             <a:fld id="{2B92EF69-4580-D948-9358-37D6C6E355D3}" type="datetimeFigureOut">
               <a:rPr lang="en-US" smtClean="0"/>
               <a:pPr/>
-              <a:t>12/7/2018</a:t>
+              <a:t>12/9/2018</a:t>
             </a:fld>
             <a:endParaRPr lang="en-US"/>
           </a:p>
@@ -404,7 +404,7 @@
             <a:fld id="{A2AF659B-3BFD-7C4F-8593-16CDDE7417A4}" type="datetimeFigureOut">
               <a:rPr lang="en-US" smtClean="0"/>
               <a:pPr/>
-              <a:t>12/7/2018</a:t>
+              <a:t>12/9/2018</a:t>
             </a:fld>
             <a:endParaRPr lang="en-US"/>
           </a:p>
@@ -4848,9 +4848,10 @@
           <a:lstStyle/>
           <a:p>
             <a:r>
-              <a:rPr lang="en-GB" dirty="0"/>
-              <a:t>The Magic</a:t>
-            </a:r>
+              <a:rPr lang="en-GB"/>
+              <a:t>This Kind of Magic…</a:t>
+            </a:r>
+            <a:endParaRPr lang="en-GB" dirty="0"/>
           </a:p>
         </p:txBody>
       </p:sp>

</xml_diff>